<commit_message>
Add another cover slide
</commit_message>
<xml_diff>
--- a/DoYouHaveAnInstant.pptx
+++ b/DoYouHaveAnInstant.pptx
@@ -5,11 +5,12 @@
     <p:sldMasterId id="2147483648" r:id="rId4"/>
   </p:sldMasterIdLst>
   <p:notesMasterIdLst>
-    <p:notesMasterId r:id="rId7"/>
+    <p:notesMasterId r:id="rId8"/>
   </p:notesMasterIdLst>
   <p:sldIdLst>
     <p:sldId id="256" r:id="rId5"/>
-    <p:sldId id="359" r:id="rId6"/>
+    <p:sldId id="360" r:id="rId6"/>
+    <p:sldId id="359" r:id="rId7"/>
   </p:sldIdLst>
   <p:sldSz cx="12192000" cy="6858000"/>
   <p:notesSz cx="6858000" cy="9144000"/>
@@ -689,6 +690,185 @@
           <a:bodyPr/>
           <a:lstStyle/>
           <a:p>
+            <a:pPr marL="0" marR="0" lvl="0" indent="0" defTabSz="457200" eaLnBrk="1" fontAlgn="auto" latinLnBrk="0" hangingPunct="1">
+              <a:lnSpc>
+                <a:spcPct val="117999"/>
+              </a:lnSpc>
+              <a:spcBef>
+                <a:spcPts val="0"/>
+              </a:spcBef>
+              <a:spcAft>
+                <a:spcPts val="0"/>
+              </a:spcAft>
+              <a:buClrTx/>
+              <a:buSzTx/>
+              <a:buFontTx/>
+              <a:buNone/>
+              <a:tabLst/>
+              <a:defRPr/>
+            </a:pPr>
+            <a:r>
+              <a:rPr lang="fr-FR" dirty="0"/>
+              <a:t>J’aurai pu sous-titrer cette courte présentation : date/time formats and issues</a:t>
+            </a:r>
+          </a:p>
+          <a:p>
+            <a:pPr marL="0" marR="0" lvl="0" indent="0" defTabSz="457200" eaLnBrk="1" fontAlgn="auto" latinLnBrk="0" hangingPunct="1">
+              <a:lnSpc>
+                <a:spcPct val="117999"/>
+              </a:lnSpc>
+              <a:spcBef>
+                <a:spcPts val="0"/>
+              </a:spcBef>
+              <a:spcAft>
+                <a:spcPts val="0"/>
+              </a:spcAft>
+              <a:buClrTx/>
+              <a:buSzTx/>
+              <a:buFontTx/>
+              <a:buNone/>
+              <a:tabLst/>
+              <a:defRPr/>
+            </a:pPr>
+            <a:r>
+              <a:rPr lang="fr-FR" dirty="0"/>
+              <a:t>Ou : pourquoi vous ne devez jamais utiliser le format </a:t>
+            </a:r>
+            <a:r>
+              <a:rPr lang="fr-FR" dirty="0" err="1"/>
+              <a:t>DateTime</a:t>
+            </a:r>
+            <a:endParaRPr lang="fr-FR" dirty="0"/>
+          </a:p>
+          <a:p>
+            <a:pPr marL="0" marR="0" lvl="0" indent="0" defTabSz="457200" eaLnBrk="1" fontAlgn="auto" latinLnBrk="0" hangingPunct="1">
+              <a:lnSpc>
+                <a:spcPct val="117999"/>
+              </a:lnSpc>
+              <a:spcBef>
+                <a:spcPts val="0"/>
+              </a:spcBef>
+              <a:spcAft>
+                <a:spcPts val="0"/>
+              </a:spcAft>
+              <a:buClrTx/>
+              <a:buSzTx/>
+              <a:buFontTx/>
+              <a:buNone/>
+              <a:tabLst/>
+              <a:defRPr/>
+            </a:pPr>
+            <a:endParaRPr lang="fr-FR" dirty="0"/>
+          </a:p>
+          <a:p>
+            <a:r>
+              <a:rPr lang="fr-FR" dirty="0"/>
+              <a:t>Déjà avant de commencer, je dois vous confesser que j’ai longtemps cru que de choisir le bon format de date était un sujet technique.  </a:t>
+            </a:r>
+          </a:p>
+          <a:p>
+            <a:endParaRPr lang="fr-FR" dirty="0"/>
+          </a:p>
+          <a:p>
+            <a:r>
+              <a:rPr lang="fr-FR" dirty="0"/>
+              <a:t>Il n’en est rien, et avec certains de mes anciens collègues, on a été confronté à tellement de cas compliqués et tordus, que je me suis dit que ce serait utile de vous partager quelques leçons apprises à la dure à l’époque.</a:t>
+            </a:r>
+          </a:p>
+          <a:p>
+            <a:endParaRPr lang="fr-FR" dirty="0"/>
+          </a:p>
+          <a:p>
+            <a:endParaRPr lang="fr-FR" dirty="0"/>
+          </a:p>
+          <a:p>
+            <a:endParaRPr lang="fr-FR" dirty="0"/>
+          </a:p>
+          <a:p>
+            <a:endParaRPr lang="fr-FR" dirty="0"/>
+          </a:p>
+        </p:txBody>
+      </p:sp>
+      <p:sp>
+        <p:nvSpPr>
+          <p:cNvPr id="4" name="Slide Number Placeholder 3"/>
+          <p:cNvSpPr>
+            <a:spLocks noGrp="1"/>
+          </p:cNvSpPr>
+          <p:nvPr>
+            <p:ph type="sldNum" sz="quarter" idx="5"/>
+          </p:nvPr>
+        </p:nvSpPr>
+        <p:spPr/>
+        <p:txBody>
+          <a:bodyPr/>
+          <a:lstStyle/>
+          <a:p>
+            <a:fld id="{788D8A45-B12B-40AF-A07B-2EBC15495A4C}" type="slidenum">
+              <a:rPr lang="fr-FR" smtClean="0"/>
+              <a:t>2</a:t>
+            </a:fld>
+            <a:endParaRPr lang="fr-FR"/>
+          </a:p>
+        </p:txBody>
+      </p:sp>
+    </p:spTree>
+    <p:extLst>
+      <p:ext uri="{BB962C8B-B14F-4D97-AF65-F5344CB8AC3E}">
+        <p14:creationId xmlns:p14="http://schemas.microsoft.com/office/powerpoint/2010/main" val="4171409041"/>
+      </p:ext>
+    </p:extLst>
+  </p:cSld>
+  <p:clrMapOvr>
+    <a:masterClrMapping/>
+  </p:clrMapOvr>
+</p:notes>
+</file>
+
+<file path=ppt/notesSlides/notesSlide3.xml><?xml version="1.0" encoding="utf-8"?>
+<p:notes xmlns:a="http://schemas.openxmlformats.org/drawingml/2006/main" xmlns:r="http://schemas.openxmlformats.org/officeDocument/2006/relationships" xmlns:p="http://schemas.openxmlformats.org/presentationml/2006/main">
+  <p:cSld>
+    <p:spTree>
+      <p:nvGrpSpPr>
+        <p:cNvPr id="1" name=""/>
+        <p:cNvGrpSpPr/>
+        <p:nvPr/>
+      </p:nvGrpSpPr>
+      <p:grpSpPr>
+        <a:xfrm>
+          <a:off x="0" y="0"/>
+          <a:ext cx="0" cy="0"/>
+          <a:chOff x="0" y="0"/>
+          <a:chExt cx="0" cy="0"/>
+        </a:xfrm>
+      </p:grpSpPr>
+      <p:sp>
+        <p:nvSpPr>
+          <p:cNvPr id="2" name="Slide Image Placeholder 1"/>
+          <p:cNvSpPr>
+            <a:spLocks noGrp="1" noRot="1" noChangeAspect="1"/>
+          </p:cNvSpPr>
+          <p:nvPr>
+            <p:ph type="sldImg"/>
+          </p:nvPr>
+        </p:nvSpPr>
+        <p:spPr/>
+      </p:sp>
+      <p:sp>
+        <p:nvSpPr>
+          <p:cNvPr id="3" name="Notes Placeholder 2"/>
+          <p:cNvSpPr>
+            <a:spLocks noGrp="1"/>
+          </p:cNvSpPr>
+          <p:nvPr>
+            <p:ph type="body" idx="1"/>
+          </p:nvPr>
+        </p:nvSpPr>
+        <p:spPr/>
+        <p:txBody>
+          <a:bodyPr/>
+          <a:lstStyle/>
+          <a:p>
             <a:r>
               <a:rPr lang="fr-FR" dirty="0"/>
               <a:t>Même si vous me connaissez comme VP Eng chez </a:t>
@@ -738,7 +918,7 @@
           <a:p>
             <a:fld id="{788D8A45-B12B-40AF-A07B-2EBC15495A4C}" type="slidenum">
               <a:rPr lang="fr-FR" smtClean="0"/>
-              <a:t>2</a:t>
+              <a:t>3</a:t>
             </a:fld>
             <a:endParaRPr lang="fr-FR"/>
           </a:p>
@@ -3993,10 +4173,10 @@
       </p:grpSpPr>
       <p:pic>
         <p:nvPicPr>
-          <p:cNvPr id="2" name="Picture 2" descr="The Race for Nuclear Time – Scientists Make Important Advance">
-            <a:extLst>
-              <a:ext uri="{FF2B5EF4-FFF2-40B4-BE49-F238E27FC236}">
-                <a16:creationId xmlns:a16="http://schemas.microsoft.com/office/drawing/2014/main" id="{CCC1C44D-69ED-EB0B-3F45-66C348F0CED1}"/>
+          <p:cNvPr id="1026" name="Picture 2" descr="atomic clock">
+            <a:extLst>
+              <a:ext uri="{FF2B5EF4-FFF2-40B4-BE49-F238E27FC236}">
+                <a16:creationId xmlns:a16="http://schemas.microsoft.com/office/drawing/2014/main" id="{DBC60563-A27E-C9F9-7790-06BFD345D6E1}"/>
               </a:ext>
             </a:extLst>
           </p:cNvPr>
@@ -4019,9 +4199,9 @@
           </a:stretch>
         </p:blipFill>
         <p:spPr bwMode="auto">
-          <a:xfrm flipH="1">
-            <a:off x="-9037899" y="-3132297"/>
-            <a:ext cx="21033873" cy="14019338"/>
+          <a:xfrm>
+            <a:off x="82196" y="-2205317"/>
+            <a:ext cx="14859733" cy="9906488"/>
           </a:xfrm>
           <a:prstGeom prst="rect">
             <a:avLst/>
@@ -4445,6 +4625,476 @@
 </file>
 
 <file path=ppt/slides/slide2.xml><?xml version="1.0" encoding="utf-8"?>
+<p:sld xmlns:a="http://schemas.openxmlformats.org/drawingml/2006/main" xmlns:r="http://schemas.openxmlformats.org/officeDocument/2006/relationships" xmlns:p="http://schemas.openxmlformats.org/presentationml/2006/main">
+  <p:cSld>
+    <p:spTree>
+      <p:nvGrpSpPr>
+        <p:cNvPr id="1" name=""/>
+        <p:cNvGrpSpPr/>
+        <p:nvPr/>
+      </p:nvGrpSpPr>
+      <p:grpSpPr>
+        <a:xfrm>
+          <a:off x="0" y="0"/>
+          <a:ext cx="0" cy="0"/>
+          <a:chOff x="0" y="0"/>
+          <a:chExt cx="0" cy="0"/>
+        </a:xfrm>
+      </p:grpSpPr>
+      <p:pic>
+        <p:nvPicPr>
+          <p:cNvPr id="2" name="Picture 2" descr="The Race for Nuclear Time – Scientists Make Important Advance">
+            <a:extLst>
+              <a:ext uri="{FF2B5EF4-FFF2-40B4-BE49-F238E27FC236}">
+                <a16:creationId xmlns:a16="http://schemas.microsoft.com/office/drawing/2014/main" id="{CCC1C44D-69ED-EB0B-3F45-66C348F0CED1}"/>
+              </a:ext>
+            </a:extLst>
+          </p:cNvPr>
+          <p:cNvPicPr>
+            <a:picLocks noChangeAspect="1" noChangeArrowheads="1"/>
+          </p:cNvPicPr>
+          <p:nvPr/>
+        </p:nvPicPr>
+        <p:blipFill>
+          <a:blip r:embed="rId3">
+            <a:extLst>
+              <a:ext uri="{28A0092B-C50C-407E-A947-70E740481C1C}">
+                <a14:useLocalDpi xmlns:a14="http://schemas.microsoft.com/office/drawing/2010/main" val="0"/>
+              </a:ext>
+            </a:extLst>
+          </a:blip>
+          <a:srcRect/>
+          <a:stretch>
+            <a:fillRect/>
+          </a:stretch>
+        </p:blipFill>
+        <p:spPr bwMode="auto">
+          <a:xfrm flipH="1">
+            <a:off x="-9037899" y="-3132297"/>
+            <a:ext cx="21033873" cy="14019338"/>
+          </a:xfrm>
+          <a:prstGeom prst="rect">
+            <a:avLst/>
+          </a:prstGeom>
+          <a:noFill/>
+          <a:extLst>
+            <a:ext uri="{909E8E84-426E-40DD-AFC4-6F175D3DCCD1}">
+              <a14:hiddenFill xmlns:a14="http://schemas.microsoft.com/office/drawing/2010/main">
+                <a:solidFill>
+                  <a:srgbClr val="FFFFFF"/>
+                </a:solidFill>
+              </a14:hiddenFill>
+            </a:ext>
+          </a:extLst>
+        </p:spPr>
+      </p:pic>
+      <p:sp>
+        <p:nvSpPr>
+          <p:cNvPr id="16" name="Rectangle 15">
+            <a:extLst>
+              <a:ext uri="{FF2B5EF4-FFF2-40B4-BE49-F238E27FC236}">
+                <a16:creationId xmlns:a16="http://schemas.microsoft.com/office/drawing/2014/main" id="{6ED7000A-D182-4D27-8D40-BCF0B0B969B1}"/>
+              </a:ext>
+            </a:extLst>
+          </p:cNvPr>
+          <p:cNvSpPr/>
+          <p:nvPr/>
+        </p:nvSpPr>
+        <p:spPr>
+          <a:xfrm>
+            <a:off x="-459956" y="-193428"/>
+            <a:ext cx="13077371" cy="8141600"/>
+          </a:xfrm>
+          <a:prstGeom prst="rect">
+            <a:avLst/>
+          </a:prstGeom>
+          <a:solidFill>
+            <a:schemeClr val="tx1">
+              <a:alpha val="19000"/>
+            </a:schemeClr>
+          </a:solidFill>
+          <a:ln>
+            <a:noFill/>
+          </a:ln>
+        </p:spPr>
+        <p:style>
+          <a:lnRef idx="2">
+            <a:schemeClr val="accent1">
+              <a:shade val="50000"/>
+            </a:schemeClr>
+          </a:lnRef>
+          <a:fillRef idx="1">
+            <a:schemeClr val="accent1"/>
+          </a:fillRef>
+          <a:effectRef idx="0">
+            <a:schemeClr val="accent1"/>
+          </a:effectRef>
+          <a:fontRef idx="minor">
+            <a:schemeClr val="lt1"/>
+          </a:fontRef>
+        </p:style>
+        <p:txBody>
+          <a:bodyPr rtlCol="0" anchor="ctr"/>
+          <a:lstStyle/>
+          <a:p>
+            <a:pPr algn="ctr"/>
+            <a:endParaRPr lang="fr-FR"/>
+          </a:p>
+        </p:txBody>
+      </p:sp>
+      <p:sp>
+        <p:nvSpPr>
+          <p:cNvPr id="7" name="Rectangle 6">
+            <a:extLst>
+              <a:ext uri="{FF2B5EF4-FFF2-40B4-BE49-F238E27FC236}">
+                <a16:creationId xmlns:a16="http://schemas.microsoft.com/office/drawing/2014/main" id="{29803296-9270-02FE-D6FE-3D20B04B3D25}"/>
+              </a:ext>
+            </a:extLst>
+          </p:cNvPr>
+          <p:cNvSpPr/>
+          <p:nvPr/>
+        </p:nvSpPr>
+        <p:spPr>
+          <a:xfrm>
+            <a:off x="0" y="4829784"/>
+            <a:ext cx="12192000" cy="1276281"/>
+          </a:xfrm>
+          <a:prstGeom prst="rect">
+            <a:avLst/>
+          </a:prstGeom>
+          <a:solidFill>
+            <a:schemeClr val="tx1">
+              <a:alpha val="82165"/>
+            </a:schemeClr>
+          </a:solidFill>
+          <a:ln>
+            <a:noFill/>
+          </a:ln>
+        </p:spPr>
+        <p:style>
+          <a:lnRef idx="2">
+            <a:schemeClr val="accent1">
+              <a:shade val="50000"/>
+            </a:schemeClr>
+          </a:lnRef>
+          <a:fillRef idx="1">
+            <a:schemeClr val="accent1"/>
+          </a:fillRef>
+          <a:effectRef idx="0">
+            <a:schemeClr val="accent1"/>
+          </a:effectRef>
+          <a:fontRef idx="minor">
+            <a:schemeClr val="lt1"/>
+          </a:fontRef>
+        </p:style>
+        <p:txBody>
+          <a:bodyPr rtlCol="0" anchor="ctr"/>
+          <a:lstStyle/>
+          <a:p>
+            <a:pPr algn="ctr"/>
+            <a:endParaRPr lang="fr-FR"/>
+          </a:p>
+        </p:txBody>
+      </p:sp>
+      <p:sp>
+        <p:nvSpPr>
+          <p:cNvPr id="13" name="TextBox 12">
+            <a:extLst>
+              <a:ext uri="{FF2B5EF4-FFF2-40B4-BE49-F238E27FC236}">
+                <a16:creationId xmlns:a16="http://schemas.microsoft.com/office/drawing/2014/main" id="{5DF07B74-75C5-49CD-8737-580C0F9937AE}"/>
+              </a:ext>
+            </a:extLst>
+          </p:cNvPr>
+          <p:cNvSpPr txBox="1"/>
+          <p:nvPr/>
+        </p:nvSpPr>
+        <p:spPr>
+          <a:xfrm>
+            <a:off x="775582" y="5206314"/>
+            <a:ext cx="6117470" cy="523220"/>
+          </a:xfrm>
+          <a:prstGeom prst="rect">
+            <a:avLst/>
+          </a:prstGeom>
+          <a:noFill/>
+        </p:spPr>
+        <p:txBody>
+          <a:bodyPr wrap="square" rtlCol="0">
+            <a:spAutoFit/>
+          </a:bodyPr>
+          <a:lstStyle/>
+          <a:p>
+            <a:r>
+              <a:rPr lang="fr-FR" sz="2800" b="1" cap="all" dirty="0">
+                <a:solidFill>
+                  <a:srgbClr val="F9D45F"/>
+                </a:solidFill>
+                <a:latin typeface="Alte Haas Grotesk" panose="02000503000000020004" pitchFamily="2" charset="0"/>
+              </a:rPr>
+              <a:t>Do </a:t>
+            </a:r>
+            <a:r>
+              <a:rPr lang="fr-FR" sz="2800" b="1" cap="all" dirty="0" err="1">
+                <a:solidFill>
+                  <a:srgbClr val="F9D45F"/>
+                </a:solidFill>
+                <a:latin typeface="Alte Haas Grotesk" panose="02000503000000020004" pitchFamily="2" charset="0"/>
+              </a:rPr>
+              <a:t>you</a:t>
+            </a:r>
+            <a:r>
+              <a:rPr lang="fr-FR" sz="2800" b="1" cap="all" dirty="0">
+                <a:solidFill>
+                  <a:srgbClr val="F9D45F"/>
+                </a:solidFill>
+                <a:latin typeface="Alte Haas Grotesk" panose="02000503000000020004" pitchFamily="2" charset="0"/>
+              </a:rPr>
+              <a:t> have an </a:t>
+            </a:r>
+            <a:r>
+              <a:rPr lang="fr-FR" sz="2800" b="1" cap="all" dirty="0">
+                <a:solidFill>
+                  <a:srgbClr val="FAFCD7"/>
+                </a:solidFill>
+                <a:latin typeface="Alte Haas Grotesk" panose="02000503000000020004" pitchFamily="2" charset="0"/>
+              </a:rPr>
+              <a:t>‘instant’?</a:t>
+            </a:r>
+          </a:p>
+        </p:txBody>
+      </p:sp>
+      <p:grpSp>
+        <p:nvGrpSpPr>
+          <p:cNvPr id="8" name="Groupe 7">
+            <a:extLst>
+              <a:ext uri="{FF2B5EF4-FFF2-40B4-BE49-F238E27FC236}">
+                <a16:creationId xmlns:a16="http://schemas.microsoft.com/office/drawing/2014/main" id="{40B76B41-4AAC-C407-FF1B-D6EE121F632B}"/>
+              </a:ext>
+            </a:extLst>
+          </p:cNvPr>
+          <p:cNvGrpSpPr/>
+          <p:nvPr/>
+        </p:nvGrpSpPr>
+        <p:grpSpPr>
+          <a:xfrm>
+            <a:off x="10221312" y="5267461"/>
+            <a:ext cx="1587102" cy="400926"/>
+            <a:chOff x="10040625" y="5267460"/>
+            <a:chExt cx="1587102" cy="400926"/>
+          </a:xfrm>
+        </p:grpSpPr>
+        <p:pic>
+          <p:nvPicPr>
+            <p:cNvPr id="6" name="Picture 5">
+              <a:extLst>
+                <a:ext uri="{FF2B5EF4-FFF2-40B4-BE49-F238E27FC236}">
+                  <a16:creationId xmlns:a16="http://schemas.microsoft.com/office/drawing/2014/main" id="{FFA769FE-E825-4AC9-BE2F-FEBFAAB8B468}"/>
+                </a:ext>
+              </a:extLst>
+            </p:cNvPr>
+            <p:cNvPicPr>
+              <a:picLocks noChangeAspect="1"/>
+            </p:cNvPicPr>
+            <p:nvPr/>
+          </p:nvPicPr>
+          <p:blipFill>
+            <a:blip r:embed="rId4">
+              <a:duotone>
+                <a:schemeClr val="bg2">
+                  <a:shade val="45000"/>
+                  <a:satMod val="135000"/>
+                </a:schemeClr>
+                <a:prstClr val="white"/>
+              </a:duotone>
+              <a:extLst>
+                <a:ext uri="{28A0092B-C50C-407E-A947-70E740481C1C}">
+                  <a14:useLocalDpi xmlns:a14="http://schemas.microsoft.com/office/drawing/2010/main" val="0"/>
+                </a:ext>
+              </a:extLst>
+            </a:blip>
+            <a:stretch>
+              <a:fillRect/>
+            </a:stretch>
+          </p:blipFill>
+          <p:spPr>
+            <a:xfrm rot="21480000">
+              <a:off x="10040625" y="5267460"/>
+              <a:ext cx="400927" cy="400926"/>
+            </a:xfrm>
+            <a:prstGeom prst="rect">
+              <a:avLst/>
+            </a:prstGeom>
+          </p:spPr>
+        </p:pic>
+        <p:sp>
+          <p:nvSpPr>
+            <p:cNvPr id="4" name="TextBox 3">
+              <a:extLst>
+                <a:ext uri="{FF2B5EF4-FFF2-40B4-BE49-F238E27FC236}">
+                  <a16:creationId xmlns:a16="http://schemas.microsoft.com/office/drawing/2014/main" id="{52DD694B-A5BD-4816-832D-6A76613F66A8}"/>
+                </a:ext>
+              </a:extLst>
+            </p:cNvPr>
+            <p:cNvSpPr txBox="1"/>
+            <p:nvPr/>
+          </p:nvSpPr>
+          <p:spPr>
+            <a:xfrm>
+              <a:off x="10328171" y="5314036"/>
+              <a:ext cx="1299556" cy="307777"/>
+            </a:xfrm>
+            <a:prstGeom prst="rect">
+              <a:avLst/>
+            </a:prstGeom>
+            <a:noFill/>
+          </p:spPr>
+          <p:txBody>
+            <a:bodyPr wrap="square" rtlCol="0">
+              <a:spAutoFit/>
+            </a:bodyPr>
+            <a:lstStyle/>
+            <a:p>
+              <a:r>
+                <a:rPr lang="fr-FR" sz="1400" b="1" dirty="0">
+                  <a:solidFill>
+                    <a:srgbClr val="DCDCDC"/>
+                  </a:solidFill>
+                  <a:latin typeface="Alte Haas Grotesk" panose="02000503000000020004" pitchFamily="2" charset="0"/>
+                </a:rPr>
+                <a:t>@tpierrain</a:t>
+              </a:r>
+            </a:p>
+          </p:txBody>
+        </p:sp>
+      </p:grpSp>
+      <p:grpSp>
+        <p:nvGrpSpPr>
+          <p:cNvPr id="3" name="Groupe 2">
+            <a:extLst>
+              <a:ext uri="{FF2B5EF4-FFF2-40B4-BE49-F238E27FC236}">
+                <a16:creationId xmlns:a16="http://schemas.microsoft.com/office/drawing/2014/main" id="{99B483B5-8899-1398-A7DB-B869D6B046DA}"/>
+              </a:ext>
+            </a:extLst>
+          </p:cNvPr>
+          <p:cNvGrpSpPr/>
+          <p:nvPr/>
+        </p:nvGrpSpPr>
+        <p:grpSpPr>
+          <a:xfrm>
+            <a:off x="7187477" y="5140787"/>
+            <a:ext cx="2846275" cy="654274"/>
+            <a:chOff x="6893052" y="5021648"/>
+            <a:chExt cx="2846275" cy="654274"/>
+          </a:xfrm>
+        </p:grpSpPr>
+        <p:sp>
+          <p:nvSpPr>
+            <p:cNvPr id="18" name="TextBox 17">
+              <a:extLst>
+                <a:ext uri="{FF2B5EF4-FFF2-40B4-BE49-F238E27FC236}">
+                  <a16:creationId xmlns:a16="http://schemas.microsoft.com/office/drawing/2014/main" id="{A6E91DBF-3E89-4D56-B673-F8A41EF8293E}"/>
+                </a:ext>
+              </a:extLst>
+            </p:cNvPr>
+            <p:cNvSpPr txBox="1"/>
+            <p:nvPr/>
+          </p:nvSpPr>
+          <p:spPr>
+            <a:xfrm>
+              <a:off x="6893052" y="5021648"/>
+              <a:ext cx="2846275" cy="369332"/>
+            </a:xfrm>
+            <a:prstGeom prst="rect">
+              <a:avLst/>
+            </a:prstGeom>
+            <a:noFill/>
+          </p:spPr>
+          <p:txBody>
+            <a:bodyPr wrap="square" lIns="91440" tIns="45720" rIns="91440" bIns="45720" rtlCol="0" anchor="t">
+              <a:spAutoFit/>
+            </a:bodyPr>
+            <a:lstStyle/>
+            <a:p>
+              <a:pPr algn="ctr"/>
+              <a:r>
+                <a:rPr lang="fr-FR" b="1" cap="all" dirty="0">
+                  <a:solidFill>
+                    <a:srgbClr val="FAFCD7"/>
+                  </a:solidFill>
+                  <a:latin typeface="Alte Haas Grotesk"/>
+                </a:rPr>
+                <a:t>Thomas </a:t>
+              </a:r>
+              <a:r>
+                <a:rPr lang="fr-FR" b="1" cap="all" dirty="0">
+                  <a:solidFill>
+                    <a:srgbClr val="F9D45F"/>
+                  </a:solidFill>
+                  <a:latin typeface="Alte Haas Grotesk"/>
+                </a:rPr>
+                <a:t>Pierrain</a:t>
+              </a:r>
+              <a:endParaRPr lang="fr-FR" b="1" cap="all" dirty="0">
+                <a:solidFill>
+                  <a:srgbClr val="F9D45F"/>
+                </a:solidFill>
+                <a:latin typeface="Alte Haas Grotesk" panose="02000503000000020004" pitchFamily="2" charset="0"/>
+              </a:endParaRPr>
+            </a:p>
+          </p:txBody>
+        </p:sp>
+        <p:pic>
+          <p:nvPicPr>
+            <p:cNvPr id="21" name="Picture 20" descr="A picture containing text, clipart&#10;&#10;Description automatically generated">
+              <a:extLst>
+                <a:ext uri="{FF2B5EF4-FFF2-40B4-BE49-F238E27FC236}">
+                  <a16:creationId xmlns:a16="http://schemas.microsoft.com/office/drawing/2014/main" id="{1450FB9A-1C1B-49BF-9565-B500F52A3CD2}"/>
+                </a:ext>
+              </a:extLst>
+            </p:cNvPr>
+            <p:cNvPicPr>
+              <a:picLocks noChangeAspect="1"/>
+            </p:cNvPicPr>
+            <p:nvPr/>
+          </p:nvPicPr>
+          <p:blipFill>
+            <a:blip r:embed="rId5">
+              <a:biLevel thresh="25000"/>
+              <a:extLst>
+                <a:ext uri="{28A0092B-C50C-407E-A947-70E740481C1C}">
+                  <a14:useLocalDpi xmlns:a14="http://schemas.microsoft.com/office/drawing/2010/main" val="0"/>
+                </a:ext>
+              </a:extLst>
+            </a:blip>
+            <a:stretch>
+              <a:fillRect/>
+            </a:stretch>
+          </p:blipFill>
+          <p:spPr>
+            <a:xfrm>
+              <a:off x="7569141" y="5390980"/>
+              <a:ext cx="1494096" cy="284942"/>
+            </a:xfrm>
+            <a:prstGeom prst="rect">
+              <a:avLst/>
+            </a:prstGeom>
+          </p:spPr>
+        </p:pic>
+      </p:grpSp>
+    </p:spTree>
+    <p:extLst>
+      <p:ext uri="{BB962C8B-B14F-4D97-AF65-F5344CB8AC3E}">
+        <p14:creationId xmlns:p14="http://schemas.microsoft.com/office/powerpoint/2010/main" val="2563912362"/>
+      </p:ext>
+    </p:extLst>
+  </p:cSld>
+  <p:clrMapOvr>
+    <a:masterClrMapping/>
+  </p:clrMapOvr>
+</p:sld>
+</file>
+
+<file path=ppt/slides/slide3.xml><?xml version="1.0" encoding="utf-8"?>
 <p:sld xmlns:a="http://schemas.openxmlformats.org/drawingml/2006/main" xmlns:r="http://schemas.openxmlformats.org/officeDocument/2006/relationships" xmlns:p="http://schemas.openxmlformats.org/presentationml/2006/main">
   <p:cSld>
     <p:spTree>
@@ -5422,9 +6072,12 @@
 </file>
 
 <file path=customXml/item1.xml><?xml version="1.0" encoding="utf-8"?>
-<p:properties xmlns:p="http://schemas.microsoft.com/office/2006/metadata/properties" xmlns:xsi="http://www.w3.org/2001/XMLSchema-instance" xmlns:pc="http://schemas.microsoft.com/office/infopath/2007/PartnerControls">
-  <documentManagement/>
-</p:properties>
+<?mso-contentType ?>
+<FormTemplates xmlns="http://schemas.microsoft.com/sharepoint/v3/contenttype/forms">
+  <Display>DocumentLibraryForm</Display>
+  <Edit>DocumentLibraryForm</Edit>
+  <New>DocumentLibraryForm</New>
+</FormTemplates>
 </file>
 
 <file path=customXml/item2.xml><?xml version="1.0" encoding="utf-8"?>
@@ -5599,27 +6252,15 @@
 </file>
 
 <file path=customXml/item3.xml><?xml version="1.0" encoding="utf-8"?>
-<?mso-contentType ?>
-<FormTemplates xmlns="http://schemas.microsoft.com/sharepoint/v3/contenttype/forms">
-  <Display>DocumentLibraryForm</Display>
-  <Edit>DocumentLibraryForm</Edit>
-  <New>DocumentLibraryForm</New>
-</FormTemplates>
+<p:properties xmlns:p="http://schemas.microsoft.com/office/2006/metadata/properties" xmlns:xsi="http://www.w3.org/2001/XMLSchema-instance" xmlns:pc="http://schemas.microsoft.com/office/infopath/2007/PartnerControls">
+  <documentManagement/>
+</p:properties>
 </file>
 
 <file path=customXml/itemProps1.xml><?xml version="1.0" encoding="utf-8"?>
-<ds:datastoreItem xmlns:ds="http://schemas.openxmlformats.org/officeDocument/2006/customXml" ds:itemID="{1EB628FD-73C9-481F-9DD6-4CC74E9FDA81}">
+<ds:datastoreItem xmlns:ds="http://schemas.openxmlformats.org/officeDocument/2006/customXml" ds:itemID="{5AF40A4F-BEE0-49EE-B0E3-3D5A3F7BB39F}">
   <ds:schemaRefs>
-    <ds:schemaRef ds:uri="http://schemas.microsoft.com/office/2006/documentManagement/types"/>
-    <ds:schemaRef ds:uri="http://schemas.openxmlformats.org/package/2006/metadata/core-properties"/>
-    <ds:schemaRef ds:uri="http://purl.org/dc/dcmitype/"/>
-    <ds:schemaRef ds:uri="http://purl.org/dc/elements/1.1/"/>
-    <ds:schemaRef ds:uri="http://schemas.microsoft.com/office/2006/metadata/properties"/>
-    <ds:schemaRef ds:uri="http://purl.org/dc/terms/"/>
-    <ds:schemaRef ds:uri="6754395f-40f2-4856-8ad7-29fcccd08a3d"/>
-    <ds:schemaRef ds:uri="http://schemas.microsoft.com/office/infopath/2007/PartnerControls"/>
-    <ds:schemaRef ds:uri="ee6c2457-0c38-4c97-91a8-94379ffa6261"/>
-    <ds:schemaRef ds:uri="http://www.w3.org/XML/1998/namespace"/>
+    <ds:schemaRef ds:uri="http://schemas.microsoft.com/sharepoint/v3/contenttype/forms"/>
   </ds:schemaRefs>
 </ds:datastoreItem>
 </file>
@@ -5644,9 +6285,18 @@
 </file>
 
 <file path=customXml/itemProps3.xml><?xml version="1.0" encoding="utf-8"?>
-<ds:datastoreItem xmlns:ds="http://schemas.openxmlformats.org/officeDocument/2006/customXml" ds:itemID="{5AF40A4F-BEE0-49EE-B0E3-3D5A3F7BB39F}">
+<ds:datastoreItem xmlns:ds="http://schemas.openxmlformats.org/officeDocument/2006/customXml" ds:itemID="{1EB628FD-73C9-481F-9DD6-4CC74E9FDA81}">
   <ds:schemaRefs>
-    <ds:schemaRef ds:uri="http://schemas.microsoft.com/sharepoint/v3/contenttype/forms"/>
+    <ds:schemaRef ds:uri="http://schemas.microsoft.com/office/2006/documentManagement/types"/>
+    <ds:schemaRef ds:uri="http://schemas.openxmlformats.org/package/2006/metadata/core-properties"/>
+    <ds:schemaRef ds:uri="http://purl.org/dc/dcmitype/"/>
+    <ds:schemaRef ds:uri="http://purl.org/dc/elements/1.1/"/>
+    <ds:schemaRef ds:uri="http://schemas.microsoft.com/office/2006/metadata/properties"/>
+    <ds:schemaRef ds:uri="http://purl.org/dc/terms/"/>
+    <ds:schemaRef ds:uri="6754395f-40f2-4856-8ad7-29fcccd08a3d"/>
+    <ds:schemaRef ds:uri="http://schemas.microsoft.com/office/infopath/2007/PartnerControls"/>
+    <ds:schemaRef ds:uri="ee6c2457-0c38-4c97-91a8-94379ffa6261"/>
+    <ds:schemaRef ds:uri="http://www.w3.org/XML/1998/namespace"/>
   </ds:schemaRefs>
 </ds:datastoreItem>
 </file>
</xml_diff>